<commit_message>
Fix a few bugs that came up in presentation 😉
</commit_message>
<xml_diff>
--- a/2021.05.18-FastAPI/Slides.pptx
+++ b/2021.05.18-FastAPI/Slides.pptx
@@ -1369,8 +1369,41 @@
           <a:lstStyle/>
           <a:p>
             <a:r>
-              <a:rPr lang="en-US"/>
-              <a:t>Example 1</a:t>
+              <a:rPr lang="en-US" sz="1200">
+                <a:solidFill>
+                  <a:srgbClr val="D4D4D4"/>
+                </a:solidFill>
+                <a:latin typeface="Consolas" panose="020B0609020204030204" pitchFamily="49" charset="0"/>
+              </a:rPr>
+              <a:t>git clone https://github.com/IntelliTect-Samples/SpokanePythonUserGroup.git</a:t>
+            </a:r>
+          </a:p>
+          <a:p>
+            <a:pPr marL="0" marR="0" lvl="0" indent="0" algn="l" defTabSz="914400" rtl="0" eaLnBrk="1" fontAlgn="auto" latinLnBrk="0" hangingPunct="1">
+              <a:lnSpc>
+                <a:spcPct val="100000"/>
+              </a:lnSpc>
+              <a:spcBef>
+                <a:spcPts val="0"/>
+              </a:spcBef>
+              <a:spcAft>
+                <a:spcPts val="0"/>
+              </a:spcAft>
+              <a:buClrTx/>
+              <a:buSzTx/>
+              <a:buFontTx/>
+              <a:buNone/>
+              <a:tabLst/>
+              <a:defRPr/>
+            </a:pPr>
+            <a:r>
+              <a:rPr lang="en-US" sz="1200">
+                <a:solidFill>
+                  <a:srgbClr val="D4D4D4"/>
+                </a:solidFill>
+                <a:latin typeface="Consolas" panose="020B0609020204030204" pitchFamily="49" charset="0"/>
+              </a:rPr>
+              <a:t>cd ./SpokanePythonUserGroup/2021.05.18-FastAPI/</a:t>
             </a:r>
           </a:p>
         </p:txBody>
@@ -1392,7 +1425,7 @@
           <a:p>
             <a:fld id="{52748864-B2E7-418F-903C-75DB0CE4B063}" type="slidenum">
               <a:rPr lang="en-US" smtClean="0"/>
-              <a:t>9</a:t>
+              <a:t>3</a:t>
             </a:fld>
             <a:endParaRPr lang="en-US"/>
           </a:p>
@@ -1401,7 +1434,7 @@
     </p:spTree>
     <p:extLst>
       <p:ext uri="{BB962C8B-B14F-4D97-AF65-F5344CB8AC3E}">
-        <p14:creationId xmlns:p14="http://schemas.microsoft.com/office/powerpoint/2010/main" val="2320062992"/>
+        <p14:creationId xmlns:p14="http://schemas.microsoft.com/office/powerpoint/2010/main" val="297894526"/>
       </p:ext>
     </p:extLst>
   </p:cSld>
@@ -1479,7 +1512,7 @@
           <a:p>
             <a:fld id="{52748864-B2E7-418F-903C-75DB0CE4B063}" type="slidenum">
               <a:rPr lang="en-US" smtClean="0"/>
-              <a:t>10</a:t>
+              <a:t>9</a:t>
             </a:fld>
             <a:endParaRPr lang="en-US"/>
           </a:p>
@@ -1488,7 +1521,7 @@
     </p:spTree>
     <p:extLst>
       <p:ext uri="{BB962C8B-B14F-4D97-AF65-F5344CB8AC3E}">
-        <p14:creationId xmlns:p14="http://schemas.microsoft.com/office/powerpoint/2010/main" val="1135863205"/>
+        <p14:creationId xmlns:p14="http://schemas.microsoft.com/office/powerpoint/2010/main" val="2320062992"/>
       </p:ext>
     </p:extLst>
   </p:cSld>
@@ -1544,7 +1577,7 @@
           <a:p>
             <a:r>
               <a:rPr lang="en-US"/>
-              <a:t>Example 2</a:t>
+              <a:t>Example 1</a:t>
             </a:r>
           </a:p>
         </p:txBody>
@@ -1566,7 +1599,7 @@
           <a:p>
             <a:fld id="{52748864-B2E7-418F-903C-75DB0CE4B063}" type="slidenum">
               <a:rPr lang="en-US" smtClean="0"/>
-              <a:t>11</a:t>
+              <a:t>10</a:t>
             </a:fld>
             <a:endParaRPr lang="en-US"/>
           </a:p>
@@ -1575,7 +1608,7 @@
     </p:spTree>
     <p:extLst>
       <p:ext uri="{BB962C8B-B14F-4D97-AF65-F5344CB8AC3E}">
-        <p14:creationId xmlns:p14="http://schemas.microsoft.com/office/powerpoint/2010/main" val="3935844993"/>
+        <p14:creationId xmlns:p14="http://schemas.microsoft.com/office/powerpoint/2010/main" val="1135863205"/>
       </p:ext>
     </p:extLst>
   </p:cSld>
@@ -1653,7 +1686,7 @@
           <a:p>
             <a:fld id="{52748864-B2E7-418F-903C-75DB0CE4B063}" type="slidenum">
               <a:rPr lang="en-US" smtClean="0"/>
-              <a:t>12</a:t>
+              <a:t>11</a:t>
             </a:fld>
             <a:endParaRPr lang="en-US"/>
           </a:p>
@@ -1662,7 +1695,7 @@
     </p:spTree>
     <p:extLst>
       <p:ext uri="{BB962C8B-B14F-4D97-AF65-F5344CB8AC3E}">
-        <p14:creationId xmlns:p14="http://schemas.microsoft.com/office/powerpoint/2010/main" val="866515268"/>
+        <p14:creationId xmlns:p14="http://schemas.microsoft.com/office/powerpoint/2010/main" val="3935844993"/>
       </p:ext>
     </p:extLst>
   </p:cSld>
@@ -1718,7 +1751,7 @@
           <a:p>
             <a:r>
               <a:rPr lang="en-US"/>
-              <a:t>Example 3</a:t>
+              <a:t>Example 2</a:t>
             </a:r>
           </a:p>
         </p:txBody>
@@ -1740,7 +1773,7 @@
           <a:p>
             <a:fld id="{52748864-B2E7-418F-903C-75DB0CE4B063}" type="slidenum">
               <a:rPr lang="en-US" smtClean="0"/>
-              <a:t>13</a:t>
+              <a:t>12</a:t>
             </a:fld>
             <a:endParaRPr lang="en-US"/>
           </a:p>
@@ -1749,7 +1782,7 @@
     </p:spTree>
     <p:extLst>
       <p:ext uri="{BB962C8B-B14F-4D97-AF65-F5344CB8AC3E}">
-        <p14:creationId xmlns:p14="http://schemas.microsoft.com/office/powerpoint/2010/main" val="586696901"/>
+        <p14:creationId xmlns:p14="http://schemas.microsoft.com/office/powerpoint/2010/main" val="866515268"/>
       </p:ext>
     </p:extLst>
   </p:cSld>
@@ -1805,27 +1838,7 @@
           <a:p>
             <a:r>
               <a:rPr lang="en-US"/>
-              <a:t>Example 4</a:t>
-            </a:r>
-          </a:p>
-          <a:p>
-            <a:pPr marL="171450" indent="-171450">
-              <a:buFontTx/>
-              <a:buChar char="-"/>
-            </a:pPr>
-            <a:r>
-              <a:rPr lang="en-US"/>
-              <a:t>Dependency Injection</a:t>
-            </a:r>
-          </a:p>
-          <a:p>
-            <a:pPr marL="171450" indent="-171450">
-              <a:buFontTx/>
-              <a:buChar char="-"/>
-            </a:pPr>
-            <a:r>
-              <a:rPr lang="en-US"/>
-              <a:t>App testing – main_test.py</a:t>
+              <a:t>Example 3</a:t>
             </a:r>
           </a:p>
         </p:txBody>
@@ -1847,6 +1860,113 @@
           <a:p>
             <a:fld id="{52748864-B2E7-418F-903C-75DB0CE4B063}" type="slidenum">
               <a:rPr lang="en-US" smtClean="0"/>
+              <a:t>13</a:t>
+            </a:fld>
+            <a:endParaRPr lang="en-US"/>
+          </a:p>
+        </p:txBody>
+      </p:sp>
+    </p:spTree>
+    <p:extLst>
+      <p:ext uri="{BB962C8B-B14F-4D97-AF65-F5344CB8AC3E}">
+        <p14:creationId xmlns:p14="http://schemas.microsoft.com/office/powerpoint/2010/main" val="586696901"/>
+      </p:ext>
+    </p:extLst>
+  </p:cSld>
+  <p:clrMapOvr>
+    <a:masterClrMapping/>
+  </p:clrMapOvr>
+</p:notes>
+</file>
+
+<file path=ppt/notesSlides/notesSlide7.xml><?xml version="1.0" encoding="utf-8"?>
+<p:notes xmlns:a="http://schemas.openxmlformats.org/drawingml/2006/main" xmlns:r="http://schemas.openxmlformats.org/officeDocument/2006/relationships" xmlns:p="http://schemas.openxmlformats.org/presentationml/2006/main">
+  <p:cSld>
+    <p:spTree>
+      <p:nvGrpSpPr>
+        <p:cNvPr id="1" name=""/>
+        <p:cNvGrpSpPr/>
+        <p:nvPr/>
+      </p:nvGrpSpPr>
+      <p:grpSpPr>
+        <a:xfrm>
+          <a:off x="0" y="0"/>
+          <a:ext cx="0" cy="0"/>
+          <a:chOff x="0" y="0"/>
+          <a:chExt cx="0" cy="0"/>
+        </a:xfrm>
+      </p:grpSpPr>
+      <p:sp>
+        <p:nvSpPr>
+          <p:cNvPr id="2" name="Slide Image Placeholder 1"/>
+          <p:cNvSpPr>
+            <a:spLocks noGrp="1" noRot="1" noChangeAspect="1"/>
+          </p:cNvSpPr>
+          <p:nvPr>
+            <p:ph type="sldImg"/>
+          </p:nvPr>
+        </p:nvSpPr>
+        <p:spPr/>
+      </p:sp>
+      <p:sp>
+        <p:nvSpPr>
+          <p:cNvPr id="3" name="Notes Placeholder 2"/>
+          <p:cNvSpPr>
+            <a:spLocks noGrp="1"/>
+          </p:cNvSpPr>
+          <p:nvPr>
+            <p:ph type="body" idx="1"/>
+          </p:nvPr>
+        </p:nvSpPr>
+        <p:spPr/>
+        <p:txBody>
+          <a:bodyPr/>
+          <a:lstStyle/>
+          <a:p>
+            <a:r>
+              <a:rPr lang="en-US"/>
+              <a:t>Example 4</a:t>
+            </a:r>
+          </a:p>
+          <a:p>
+            <a:pPr marL="171450" indent="-171450">
+              <a:buFontTx/>
+              <a:buChar char="-"/>
+            </a:pPr>
+            <a:r>
+              <a:rPr lang="en-US"/>
+              <a:t>Dependency Injection</a:t>
+            </a:r>
+          </a:p>
+          <a:p>
+            <a:pPr marL="171450" indent="-171450">
+              <a:buFontTx/>
+              <a:buChar char="-"/>
+            </a:pPr>
+            <a:r>
+              <a:rPr lang="en-US"/>
+              <a:t>App testing – main_test.py</a:t>
+            </a:r>
+          </a:p>
+        </p:txBody>
+      </p:sp>
+      <p:sp>
+        <p:nvSpPr>
+          <p:cNvPr id="4" name="Slide Number Placeholder 3"/>
+          <p:cNvSpPr>
+            <a:spLocks noGrp="1"/>
+          </p:cNvSpPr>
+          <p:nvPr>
+            <p:ph type="sldNum" sz="quarter" idx="5"/>
+          </p:nvPr>
+        </p:nvSpPr>
+        <p:spPr/>
+        <p:txBody>
+          <a:bodyPr/>
+          <a:lstStyle/>
+          <a:p>
+            <a:fld id="{52748864-B2E7-418F-903C-75DB0CE4B063}" type="slidenum">
+              <a:rPr lang="en-US" smtClean="0"/>
               <a:t>14</a:t>
             </a:fld>
             <a:endParaRPr lang="en-US"/>
@@ -1866,7 +1986,7 @@
 </p:notes>
 </file>
 
-<file path=ppt/notesSlides/notesSlide7.xml><?xml version="1.0" encoding="utf-8"?>
+<file path=ppt/notesSlides/notesSlide8.xml><?xml version="1.0" encoding="utf-8"?>
 <p:notes xmlns:a="http://schemas.openxmlformats.org/drawingml/2006/main" xmlns:r="http://schemas.openxmlformats.org/officeDocument/2006/relationships" xmlns:p="http://schemas.openxmlformats.org/presentationml/2006/main">
   <p:cSld>
     <p:spTree>
@@ -13969,21 +14089,6 @@
 </file>
 
 <file path=customXml/item1.xml><?xml version="1.0" encoding="utf-8"?>
-<p:properties xmlns:p="http://schemas.microsoft.com/office/2006/metadata/properties" xmlns:xsi="http://www.w3.org/2001/XMLSchema-instance" xmlns:pc="http://schemas.microsoft.com/office/infopath/2007/PartnerControls">
-  <documentManagement/>
-</p:properties>
-</file>
-
-<file path=customXml/item2.xml><?xml version="1.0" encoding="utf-8"?>
-<?mso-contentType ?>
-<FormTemplates xmlns="http://schemas.microsoft.com/sharepoint/v3/contenttype/forms">
-  <Display>DocumentLibraryForm</Display>
-  <Edit>DocumentLibraryForm</Edit>
-  <New>DocumentLibraryForm</New>
-</FormTemplates>
-</file>
-
-<file path=customXml/item3.xml><?xml version="1.0" encoding="utf-8"?>
 <ct:contentTypeSchema xmlns:ct="http://schemas.microsoft.com/office/2006/metadata/contentType" xmlns:ma="http://schemas.microsoft.com/office/2006/metadata/properties/metaAttributes" ct:_="" ma:_="" ma:contentTypeName="Document" ma:contentTypeID="0x010100A79879BD40A98C4481EFF79AB481711F" ma:contentTypeVersion="7" ma:contentTypeDescription="Create a new document." ma:contentTypeScope="" ma:versionID="1c502ded22189efc4be3fe70fe5807ce">
   <xsd:schema xmlns:xsd="http://www.w3.org/2001/XMLSchema" xmlns:xs="http://www.w3.org/2001/XMLSchema" xmlns:p="http://schemas.microsoft.com/office/2006/metadata/properties" xmlns:ns2="8646abf5-e766-4778-b378-eac61338b6a4" targetNamespace="http://schemas.microsoft.com/office/2006/metadata/properties" ma:root="true" ma:fieldsID="e042ddf904d11f03819d008e6a927b4d" ns2:_="">
     <xsd:import namespace="8646abf5-e766-4778-b378-eac61338b6a4"/>
@@ -14147,31 +14252,22 @@
 </ct:contentTypeSchema>
 </file>
 
-<file path=customXml/itemProps1.xml><?xml version="1.0" encoding="utf-8"?>
-<ds:datastoreItem xmlns:ds="http://schemas.openxmlformats.org/officeDocument/2006/customXml" ds:itemID="{3FCACDFE-9D7B-4273-BE0B-721E62419DFE}">
-  <ds:schemaRefs>
-    <ds:schemaRef ds:uri="http://www.w3.org/XML/1998/namespace"/>
-    <ds:schemaRef ds:uri="http://purl.org/dc/elements/1.1/"/>
-    <ds:schemaRef ds:uri="http://purl.org/dc/dcmitype/"/>
-    <ds:schemaRef ds:uri="http://schemas.microsoft.com/office/2006/metadata/properties"/>
-    <ds:schemaRef ds:uri="http://purl.org/dc/terms/"/>
-    <ds:schemaRef ds:uri="http://schemas.microsoft.com/office/2006/documentManagement/types"/>
-    <ds:schemaRef ds:uri="http://schemas.microsoft.com/office/infopath/2007/PartnerControls"/>
-    <ds:schemaRef ds:uri="http://schemas.openxmlformats.org/package/2006/metadata/core-properties"/>
-    <ds:schemaRef ds:uri="8646abf5-e766-4778-b378-eac61338b6a4"/>
-  </ds:schemaRefs>
-</ds:datastoreItem>
+<file path=customXml/item2.xml><?xml version="1.0" encoding="utf-8"?>
+<?mso-contentType ?>
+<FormTemplates xmlns="http://schemas.microsoft.com/sharepoint/v3/contenttype/forms">
+  <Display>DocumentLibraryForm</Display>
+  <Edit>DocumentLibraryForm</Edit>
+  <New>DocumentLibraryForm</New>
+</FormTemplates>
 </file>
 
-<file path=customXml/itemProps2.xml><?xml version="1.0" encoding="utf-8"?>
-<ds:datastoreItem xmlns:ds="http://schemas.openxmlformats.org/officeDocument/2006/customXml" ds:itemID="{AF5341F6-647E-4A77-8D9B-BBDB0D16D47B}">
-  <ds:schemaRefs>
-    <ds:schemaRef ds:uri="http://schemas.microsoft.com/sharepoint/v3/contenttype/forms"/>
-  </ds:schemaRefs>
-</ds:datastoreItem>
+<file path=customXml/item3.xml><?xml version="1.0" encoding="utf-8"?>
+<p:properties xmlns:p="http://schemas.microsoft.com/office/2006/metadata/properties" xmlns:xsi="http://www.w3.org/2001/XMLSchema-instance" xmlns:pc="http://schemas.microsoft.com/office/infopath/2007/PartnerControls">
+  <documentManagement/>
+</p:properties>
 </file>
 
-<file path=customXml/itemProps3.xml><?xml version="1.0" encoding="utf-8"?>
+<file path=customXml/itemProps1.xml><?xml version="1.0" encoding="utf-8"?>
 <ds:datastoreItem xmlns:ds="http://schemas.openxmlformats.org/officeDocument/2006/customXml" ds:itemID="{B21C005B-494C-4A46-B86D-7E5F051317FA}">
   <ds:schemaRefs>
     <ds:schemaRef ds:uri="http://schemas.microsoft.com/office/2006/metadata/contentType"/>
@@ -14187,4 +14283,28 @@
     <ds:schemaRef ds:uri="http://schemas.microsoft.com/internal/obd"/>
   </ds:schemaRefs>
 </ds:datastoreItem>
+</file>
+
+<file path=customXml/itemProps2.xml><?xml version="1.0" encoding="utf-8"?>
+<ds:datastoreItem xmlns:ds="http://schemas.openxmlformats.org/officeDocument/2006/customXml" ds:itemID="{AF5341F6-647E-4A77-8D9B-BBDB0D16D47B}">
+  <ds:schemaRefs>
+    <ds:schemaRef ds:uri="http://schemas.microsoft.com/sharepoint/v3/contenttype/forms"/>
+  </ds:schemaRefs>
+</ds:datastoreItem>
+</file>
+
+<file path=customXml/itemProps3.xml><?xml version="1.0" encoding="utf-8"?>
+<ds:datastoreItem xmlns:ds="http://schemas.openxmlformats.org/officeDocument/2006/customXml" ds:itemID="{3FCACDFE-9D7B-4273-BE0B-721E62419DFE}">
+  <ds:schemaRefs>
+    <ds:schemaRef ds:uri="http://www.w3.org/XML/1998/namespace"/>
+    <ds:schemaRef ds:uri="http://purl.org/dc/elements/1.1/"/>
+    <ds:schemaRef ds:uri="http://purl.org/dc/dcmitype/"/>
+    <ds:schemaRef ds:uri="http://schemas.microsoft.com/office/2006/metadata/properties"/>
+    <ds:schemaRef ds:uri="http://purl.org/dc/terms/"/>
+    <ds:schemaRef ds:uri="http://schemas.microsoft.com/office/2006/documentManagement/types"/>
+    <ds:schemaRef ds:uri="http://schemas.microsoft.com/office/infopath/2007/PartnerControls"/>
+    <ds:schemaRef ds:uri="http://schemas.openxmlformats.org/package/2006/metadata/core-properties"/>
+    <ds:schemaRef ds:uri="8646abf5-e766-4778-b378-eac61338b6a4"/>
+  </ds:schemaRefs>
+</ds:datastoreItem>
 </file>
</xml_diff>